<commit_message>
Carga primer modulo - IEE. Ilustraciones vectoriales
</commit_message>
<xml_diff>
--- a/fuentes/estructura/BASC2014_EstructuraCursoCATSP.pptx
+++ b/fuentes/estructura/BASC2014_EstructuraCursoCATSP.pptx
@@ -2716,73 +2716,73 @@
     </dgm:pt>
   </dgm:ptLst>
   <dgm:cxnLst>
+    <dgm:cxn modelId="{825685EF-2145-48EB-A0AA-7E914F476BB0}" type="presOf" srcId="{F20BD17E-E5FA-485D-AC44-2B89B6FCC443}" destId="{93A12725-4617-4C45-BEB1-D43F16484142}" srcOrd="0" destOrd="0" presId="urn:microsoft.com/office/officeart/2005/8/layout/hierarchy2"/>
+    <dgm:cxn modelId="{A59EA14B-9238-4FBE-9990-5A38F0DFC22E}" srcId="{F20BD17E-E5FA-485D-AC44-2B89B6FCC443}" destId="{321B2CF3-9BFD-4143-9FDE-0BB43B55AB36}" srcOrd="0" destOrd="0" parTransId="{19E95A2F-1DAA-48F2-B7FD-92D4403DFE3B}" sibTransId="{73335CAA-F43E-4676-82C4-E4DE83E9B8AC}"/>
+    <dgm:cxn modelId="{9979525C-5CFB-4DCB-958D-342DC6736BDF}" type="presOf" srcId="{8FB553AC-2415-4269-8C91-39D08E223E46}" destId="{0DA00C24-AADE-4C9A-A625-E4BDB19BA90C}" srcOrd="0" destOrd="0" presId="urn:microsoft.com/office/officeart/2005/8/layout/hierarchy2"/>
+    <dgm:cxn modelId="{2BA27862-EDAB-4EC6-AD47-4B6DF40591AC}" srcId="{C3257D7D-F64B-4E69-A9B0-D8C985940F1F}" destId="{A8E87F4D-FD3F-48C9-94F6-7779FDA6558C}" srcOrd="1" destOrd="0" parTransId="{94EFE80F-AA5D-4311-AE62-3837F981B4CD}" sibTransId="{27A13C93-927D-4D8C-B5C0-8BD648B44FED}"/>
     <dgm:cxn modelId="{67ABAF85-E5F2-4A66-BA1C-D95395557837}" type="presOf" srcId="{BF2576C9-890D-4A8B-855F-67BFF3C6A0B0}" destId="{12248FC9-7DE8-4B2F-897B-F6DCD84291EA}" srcOrd="1" destOrd="0" presId="urn:microsoft.com/office/officeart/2005/8/layout/hierarchy2"/>
-    <dgm:cxn modelId="{590A7A70-617C-466B-8F49-2F3297618C1D}" type="presOf" srcId="{321B2CF3-9BFD-4143-9FDE-0BB43B55AB36}" destId="{C74F4080-0AA8-42AD-9713-3267D187E33A}" srcOrd="0" destOrd="0" presId="urn:microsoft.com/office/officeart/2005/8/layout/hierarchy2"/>
     <dgm:cxn modelId="{2792D31D-0BA4-47E8-9EA9-86446FA06396}" type="presOf" srcId="{57EC5317-5FDC-4F2E-810C-627F1F951152}" destId="{D3680F41-1195-4452-BBEE-962B4F5BC9B1}" srcOrd="0" destOrd="0" presId="urn:microsoft.com/office/officeart/2005/8/layout/hierarchy2"/>
+    <dgm:cxn modelId="{03587965-F210-4581-B3B9-9C8C556CD0B9}" type="presOf" srcId="{19E95A2F-1DAA-48F2-B7FD-92D4403DFE3B}" destId="{91665B73-CCEB-45BE-9AB3-26A213CB8A2E}" srcOrd="0" destOrd="0" presId="urn:microsoft.com/office/officeart/2005/8/layout/hierarchy2"/>
+    <dgm:cxn modelId="{C878CE1B-CD01-4D2C-8B51-3FB59E30E58F}" type="presOf" srcId="{6F8AD765-1CB1-44CA-8FBC-F9BBA68B56E1}" destId="{5CB5FE40-D36D-40F4-A014-7933BF077F9B}" srcOrd="0" destOrd="0" presId="urn:microsoft.com/office/officeart/2005/8/layout/hierarchy2"/>
+    <dgm:cxn modelId="{EF72DDF6-8B42-400B-BF70-67CDDDBEF6B9}" type="presOf" srcId="{94EFE80F-AA5D-4311-AE62-3837F981B4CD}" destId="{684A3C69-67F1-463C-A111-F1DCC377F93F}" srcOrd="1" destOrd="0" presId="urn:microsoft.com/office/officeart/2005/8/layout/hierarchy2"/>
+    <dgm:cxn modelId="{BF3E374E-3E7A-46FE-B95A-87B8CBF7FA69}" type="presOf" srcId="{154746DB-D8A0-4500-A125-4E2E98FDDA84}" destId="{FA9B5342-CFD8-41A5-A237-88439EF2F93A}" srcOrd="0" destOrd="0" presId="urn:microsoft.com/office/officeart/2005/8/layout/hierarchy2"/>
+    <dgm:cxn modelId="{21F8278B-BA96-4B5B-85F3-AE9D223041E7}" type="presOf" srcId="{CBEAA09E-BEA6-49DF-B3DC-69DEDC5F5DD7}" destId="{A4595CB8-0FC0-4BE0-9D3B-3BE04EB7F4DB}" srcOrd="0" destOrd="0" presId="urn:microsoft.com/office/officeart/2005/8/layout/hierarchy2"/>
+    <dgm:cxn modelId="{21079303-D87E-438E-978C-DD75F0B270BB}" type="presOf" srcId="{476D38AA-EEE8-41BF-8749-7DBA59123A9E}" destId="{684C32BA-1D89-46B5-A84B-C9EE3DA78CE0}" srcOrd="1" destOrd="0" presId="urn:microsoft.com/office/officeart/2005/8/layout/hierarchy2"/>
+    <dgm:cxn modelId="{84251D9B-354F-4450-BCFE-B8C73E03A245}" type="presOf" srcId="{32A2791E-A72E-4517-85C9-B2A6282450EC}" destId="{0177334F-64F8-4584-8D29-A4045505A7AE}" srcOrd="1" destOrd="0" presId="urn:microsoft.com/office/officeart/2005/8/layout/hierarchy2"/>
+    <dgm:cxn modelId="{E6B8561B-E5A3-4090-8562-FA678A2581B0}" srcId="{D7716EDA-20F9-4FAB-B7D1-38101357E949}" destId="{9D097639-AD92-495A-BFB3-501A8B7B590B}" srcOrd="0" destOrd="0" parTransId="{2294DED9-1EC7-4A8F-9EC3-177261F2F57E}" sibTransId="{1B5E60FB-22BE-4EBE-81AD-81B512FEE320}"/>
+    <dgm:cxn modelId="{A2A83169-574E-4097-98CA-6A054F87B5B0}" type="presOf" srcId="{A10B55BC-6984-4C19-B5EA-A1A2702BD90C}" destId="{42B7BC8A-F7DE-4713-8427-75284D6475EA}" srcOrd="1" destOrd="0" presId="urn:microsoft.com/office/officeart/2005/8/layout/hierarchy2"/>
+    <dgm:cxn modelId="{FC964E5C-9055-439E-995D-AA4063205647}" type="presOf" srcId="{A10B55BC-6984-4C19-B5EA-A1A2702BD90C}" destId="{8A70ADEC-3769-486F-9739-921FC2767A18}" srcOrd="0" destOrd="0" presId="urn:microsoft.com/office/officeart/2005/8/layout/hierarchy2"/>
+    <dgm:cxn modelId="{CD9CFE4E-98ED-41B8-BAD9-F25035D655AC}" srcId="{C3257D7D-F64B-4E69-A9B0-D8C985940F1F}" destId="{79434E08-139B-4C97-B8FE-6E52FAF621CA}" srcOrd="0" destOrd="0" parTransId="{154746DB-D8A0-4500-A125-4E2E98FDDA84}" sibTransId="{B4FA7227-73A0-40F8-9F32-5C11A3531418}"/>
+    <dgm:cxn modelId="{C47FD917-2484-4255-9FE1-372C9A673849}" srcId="{D647D25A-0F34-4670-8C59-23BA0A9B4939}" destId="{ADB94EBC-B4DC-404A-9A26-926C15DEDBB5}" srcOrd="2" destOrd="0" parTransId="{721D8E6D-DA6C-4BE2-B0B4-61633B8AAB5C}" sibTransId="{1F927442-54FC-4F81-BC61-942DAC483916}"/>
     <dgm:cxn modelId="{7C3639E8-0066-4A5B-90AF-ED7F1ED18E75}" srcId="{C3257D7D-F64B-4E69-A9B0-D8C985940F1F}" destId="{8BC2EAFB-020F-432E-8685-01B48095D60D}" srcOrd="2" destOrd="0" parTransId="{32A2791E-A72E-4517-85C9-B2A6282450EC}" sibTransId="{F81E5B47-B0A7-407B-8DB0-C6FC645062DF}"/>
+    <dgm:cxn modelId="{662B5C90-E650-48DD-B771-A3F3741F3C71}" type="presOf" srcId="{BF2576C9-890D-4A8B-855F-67BFF3C6A0B0}" destId="{EE6DA4A3-BC98-4A40-A971-73D75F87805F}" srcOrd="0" destOrd="0" presId="urn:microsoft.com/office/officeart/2005/8/layout/hierarchy2"/>
+    <dgm:cxn modelId="{89D521A1-B0B7-4AA1-9FF8-6299FA86705F}" srcId="{3DC0F2F4-7FEE-4DB8-82DB-D2459B76649C}" destId="{E09C58EE-205F-4A6E-8A9C-3AA838C18B26}" srcOrd="2" destOrd="0" parTransId="{D15A0EEA-7FCA-4DF5-8D88-E59A0BBF70A0}" sibTransId="{3E9DB246-AB4A-4752-88FB-0AADFB86A160}"/>
+    <dgm:cxn modelId="{7687FB8D-6C3D-40A7-BA30-DFCD7FDFE9AC}" type="presOf" srcId="{C2CD1A7A-A3F9-4A81-A673-D57E0723DFFF}" destId="{0E85FF7D-408D-4251-9E74-C772FB887E90}" srcOrd="0" destOrd="0" presId="urn:microsoft.com/office/officeart/2005/8/layout/hierarchy2"/>
+    <dgm:cxn modelId="{EA90AB12-FDAE-4FC7-B5E6-CF3C57526BA4}" type="presOf" srcId="{79434E08-139B-4C97-B8FE-6E52FAF621CA}" destId="{92D34674-AFCB-4F44-8FCD-362929E6E4EF}" srcOrd="0" destOrd="0" presId="urn:microsoft.com/office/officeart/2005/8/layout/hierarchy2"/>
     <dgm:cxn modelId="{6CEC29E8-B12F-4AE3-AA13-2F009F7678C9}" type="presOf" srcId="{E358B682-132B-4448-8199-98731FF907A8}" destId="{EDFE39FD-83D6-41C3-B6C7-F60ABD8B37F2}" srcOrd="0" destOrd="0" presId="urn:microsoft.com/office/officeart/2005/8/layout/hierarchy2"/>
-    <dgm:cxn modelId="{2A0C67EE-9E7C-4593-926F-134381B3DB02}" srcId="{D647D25A-0F34-4670-8C59-23BA0A9B4939}" destId="{46F303BD-D8DF-4218-84DC-82D20CC9A872}" srcOrd="3" destOrd="0" parTransId="{476D38AA-EEE8-41BF-8749-7DBA59123A9E}" sibTransId="{AFED4044-180F-48F5-8644-5B8DC6F06744}"/>
-    <dgm:cxn modelId="{EF72DDF6-8B42-400B-BF70-67CDDDBEF6B9}" type="presOf" srcId="{94EFE80F-AA5D-4311-AE62-3837F981B4CD}" destId="{684A3C69-67F1-463C-A111-F1DCC377F93F}" srcOrd="1" destOrd="0" presId="urn:microsoft.com/office/officeart/2005/8/layout/hierarchy2"/>
-    <dgm:cxn modelId="{03587965-F210-4581-B3B9-9C8C556CD0B9}" type="presOf" srcId="{19E95A2F-1DAA-48F2-B7FD-92D4403DFE3B}" destId="{91665B73-CCEB-45BE-9AB3-26A213CB8A2E}" srcOrd="0" destOrd="0" presId="urn:microsoft.com/office/officeart/2005/8/layout/hierarchy2"/>
     <dgm:cxn modelId="{F82B8FE1-9C66-4589-BDB1-0685095EF6F3}" srcId="{3DC0F2F4-7FEE-4DB8-82DB-D2459B76649C}" destId="{F20BD17E-E5FA-485D-AC44-2B89B6FCC443}" srcOrd="1" destOrd="0" parTransId="{57EC5317-5FDC-4F2E-810C-627F1F951152}" sibTransId="{0CA64F8E-6287-4A1B-AC1C-E507A1F7CFA6}"/>
-    <dgm:cxn modelId="{B37FCC2A-E4C0-4686-A6B7-DF229C955E61}" type="presOf" srcId="{D647D25A-0F34-4670-8C59-23BA0A9B4939}" destId="{B65696F3-61D9-4989-9359-AA1CAD796701}" srcOrd="0" destOrd="0" presId="urn:microsoft.com/office/officeart/2005/8/layout/hierarchy2"/>
-    <dgm:cxn modelId="{EA90AB12-FDAE-4FC7-B5E6-CF3C57526BA4}" type="presOf" srcId="{79434E08-139B-4C97-B8FE-6E52FAF621CA}" destId="{92D34674-AFCB-4F44-8FCD-362929E6E4EF}" srcOrd="0" destOrd="0" presId="urn:microsoft.com/office/officeart/2005/8/layout/hierarchy2"/>
-    <dgm:cxn modelId="{CD9CFE4E-98ED-41B8-BAD9-F25035D655AC}" srcId="{C3257D7D-F64B-4E69-A9B0-D8C985940F1F}" destId="{79434E08-139B-4C97-B8FE-6E52FAF621CA}" srcOrd="0" destOrd="0" parTransId="{154746DB-D8A0-4500-A125-4E2E98FDDA84}" sibTransId="{B4FA7227-73A0-40F8-9F32-5C11A3531418}"/>
-    <dgm:cxn modelId="{EAB82487-8C9A-4EDB-B0F9-51D4936AA3F9}" type="presOf" srcId="{6F8AD765-1CB1-44CA-8FBC-F9BBA68B56E1}" destId="{6CE67ACE-8C8B-4E40-94E2-9FD2E7292F87}" srcOrd="1" destOrd="0" presId="urn:microsoft.com/office/officeart/2005/8/layout/hierarchy2"/>
-    <dgm:cxn modelId="{9979525C-5CFB-4DCB-958D-342DC6736BDF}" type="presOf" srcId="{8FB553AC-2415-4269-8C91-39D08E223E46}" destId="{0DA00C24-AADE-4C9A-A625-E4BDB19BA90C}" srcOrd="0" destOrd="0" presId="urn:microsoft.com/office/officeart/2005/8/layout/hierarchy2"/>
-    <dgm:cxn modelId="{F57265DA-D2AA-4F0E-89A5-9FA03FFC168B}" type="presOf" srcId="{476D38AA-EEE8-41BF-8749-7DBA59123A9E}" destId="{04E3F8F1-6B3C-4E37-A25A-3F12466BFCA5}" srcOrd="0" destOrd="0" presId="urn:microsoft.com/office/officeart/2005/8/layout/hierarchy2"/>
-    <dgm:cxn modelId="{CCA83B69-ABE5-40D5-86AC-30CA2C0F25CB}" type="presOf" srcId="{94EFE80F-AA5D-4311-AE62-3837F981B4CD}" destId="{07BFDBEE-4B3A-4C4B-BFFC-6D3B24FA768B}" srcOrd="0" destOrd="0" presId="urn:microsoft.com/office/officeart/2005/8/layout/hierarchy2"/>
-    <dgm:cxn modelId="{9206D8DF-1665-4E7F-A76B-C70F170485F7}" type="presOf" srcId="{EA0207A9-04E4-4255-A27B-994ECB988C09}" destId="{940DB865-9134-49E2-BC49-EA3495840E23}" srcOrd="0" destOrd="0" presId="urn:microsoft.com/office/officeart/2005/8/layout/hierarchy2"/>
-    <dgm:cxn modelId="{89D521A1-B0B7-4AA1-9FF8-6299FA86705F}" srcId="{3DC0F2F4-7FEE-4DB8-82DB-D2459B76649C}" destId="{E09C58EE-205F-4A6E-8A9C-3AA838C18B26}" srcOrd="2" destOrd="0" parTransId="{D15A0EEA-7FCA-4DF5-8D88-E59A0BBF70A0}" sibTransId="{3E9DB246-AB4A-4752-88FB-0AADFB86A160}"/>
+    <dgm:cxn modelId="{7C811853-A9D1-49C9-A736-FD1502F93ECA}" type="presOf" srcId="{46F303BD-D8DF-4218-84DC-82D20CC9A872}" destId="{CE93C166-882D-4077-84D2-0F528447539C}" srcOrd="0" destOrd="0" presId="urn:microsoft.com/office/officeart/2005/8/layout/hierarchy2"/>
     <dgm:cxn modelId="{44F87193-2B93-4FB1-8C33-A1712DB84F32}" type="presOf" srcId="{A8E87F4D-FD3F-48C9-94F6-7779FDA6558C}" destId="{ABDB245D-A9DB-4026-876B-3992236D1489}" srcOrd="0" destOrd="0" presId="urn:microsoft.com/office/officeart/2005/8/layout/hierarchy2"/>
-    <dgm:cxn modelId="{12A87CB4-ABD0-43BD-92FC-45D56C39B646}" srcId="{D647D25A-0F34-4670-8C59-23BA0A9B4939}" destId="{EA0207A9-04E4-4255-A27B-994ECB988C09}" srcOrd="0" destOrd="0" parTransId="{BF2576C9-890D-4A8B-855F-67BFF3C6A0B0}" sibTransId="{AEF683F9-F799-417F-A78B-C3EACD4D985C}"/>
-    <dgm:cxn modelId="{662B5C90-E650-48DD-B771-A3F3741F3C71}" type="presOf" srcId="{BF2576C9-890D-4A8B-855F-67BFF3C6A0B0}" destId="{EE6DA4A3-BC98-4A40-A971-73D75F87805F}" srcOrd="0" destOrd="0" presId="urn:microsoft.com/office/officeart/2005/8/layout/hierarchy2"/>
-    <dgm:cxn modelId="{C47FD917-2484-4255-9FE1-372C9A673849}" srcId="{D647D25A-0F34-4670-8C59-23BA0A9B4939}" destId="{ADB94EBC-B4DC-404A-9A26-926C15DEDBB5}" srcOrd="2" destOrd="0" parTransId="{721D8E6D-DA6C-4BE2-B0B4-61633B8AAB5C}" sibTransId="{1F927442-54FC-4F81-BC61-942DAC483916}"/>
-    <dgm:cxn modelId="{A2A83169-574E-4097-98CA-6A054F87B5B0}" type="presOf" srcId="{A10B55BC-6984-4C19-B5EA-A1A2702BD90C}" destId="{42B7BC8A-F7DE-4713-8427-75284D6475EA}" srcOrd="1" destOrd="0" presId="urn:microsoft.com/office/officeart/2005/8/layout/hierarchy2"/>
-    <dgm:cxn modelId="{C67C78E9-FFC3-421D-AAAE-CB9C6659AE2C}" type="presOf" srcId="{32A2791E-A72E-4517-85C9-B2A6282450EC}" destId="{8D9823FB-FE6E-45BE-84C7-56792F03D4C9}" srcOrd="0" destOrd="0" presId="urn:microsoft.com/office/officeart/2005/8/layout/hierarchy2"/>
-    <dgm:cxn modelId="{5E919555-8C7D-41E2-8430-C8E3C3C743AA}" type="presOf" srcId="{ECBBADDE-B3CF-416C-B24B-85E7824F361E}" destId="{CE8CEF7E-4AA8-4BA7-82BC-8376E5C4DD40}" srcOrd="0" destOrd="0" presId="urn:microsoft.com/office/officeart/2005/8/layout/hierarchy2"/>
-    <dgm:cxn modelId="{84251D9B-354F-4450-BCFE-B8C73E03A245}" type="presOf" srcId="{32A2791E-A72E-4517-85C9-B2A6282450EC}" destId="{0177334F-64F8-4584-8D29-A4045505A7AE}" srcOrd="1" destOrd="0" presId="urn:microsoft.com/office/officeart/2005/8/layout/hierarchy2"/>
-    <dgm:cxn modelId="{2BA27862-EDAB-4EC6-AD47-4B6DF40591AC}" srcId="{C3257D7D-F64B-4E69-A9B0-D8C985940F1F}" destId="{A8E87F4D-FD3F-48C9-94F6-7779FDA6558C}" srcOrd="1" destOrd="0" parTransId="{94EFE80F-AA5D-4311-AE62-3837F981B4CD}" sibTransId="{27A13C93-927D-4D8C-B5C0-8BD648B44FED}"/>
-    <dgm:cxn modelId="{FC964E5C-9055-439E-995D-AA4063205647}" type="presOf" srcId="{A10B55BC-6984-4C19-B5EA-A1A2702BD90C}" destId="{8A70ADEC-3769-486F-9739-921FC2767A18}" srcOrd="0" destOrd="0" presId="urn:microsoft.com/office/officeart/2005/8/layout/hierarchy2"/>
     <dgm:cxn modelId="{9AB89FBC-4C24-4D83-8547-4263C11BB27B}" type="presOf" srcId="{19E95A2F-1DAA-48F2-B7FD-92D4403DFE3B}" destId="{B00F00C1-4279-4F54-B524-F5493B92D97C}" srcOrd="1" destOrd="0" presId="urn:microsoft.com/office/officeart/2005/8/layout/hierarchy2"/>
     <dgm:cxn modelId="{1191333D-D000-4AA1-A07E-8A0F9D27E257}" type="presOf" srcId="{9D097639-AD92-495A-BFB3-501A8B7B590B}" destId="{90297072-4BF8-4741-B486-6ED433102DCF}" srcOrd="0" destOrd="0" presId="urn:microsoft.com/office/officeart/2005/8/layout/hierarchy2"/>
-    <dgm:cxn modelId="{662B0DAF-CF29-4A2F-9CEB-EF68B3231DFD}" type="presOf" srcId="{E358B682-132B-4448-8199-98731FF907A8}" destId="{7717090A-5638-4A41-B564-1906ED06751F}" srcOrd="1" destOrd="0" presId="urn:microsoft.com/office/officeart/2005/8/layout/hierarchy2"/>
+    <dgm:cxn modelId="{38E31C0D-AFCD-4338-AD8A-68F37C6D96A8}" type="presOf" srcId="{154746DB-D8A0-4500-A125-4E2E98FDDA84}" destId="{DF0C410B-ED64-4847-81D7-4933087A2B10}" srcOrd="1" destOrd="0" presId="urn:microsoft.com/office/officeart/2005/8/layout/hierarchy2"/>
+    <dgm:cxn modelId="{13C76CC4-9C6C-4B5E-9987-6BC27616BFF3}" type="presOf" srcId="{3DC0F2F4-7FEE-4DB8-82DB-D2459B76649C}" destId="{BFC8E187-1C0A-4835-BB28-66711531D03F}" srcOrd="0" destOrd="0" presId="urn:microsoft.com/office/officeart/2005/8/layout/hierarchy2"/>
     <dgm:cxn modelId="{3AF88AEB-F2F4-48CD-82E9-8076AE0A0182}" type="presOf" srcId="{423A31C6-514D-4BE5-9EBB-8EC7769AEF01}" destId="{CEB5FC99-D960-43C2-8C18-6F2F83FEDA97}" srcOrd="1" destOrd="0" presId="urn:microsoft.com/office/officeart/2005/8/layout/hierarchy2"/>
-    <dgm:cxn modelId="{BF3E374E-3E7A-46FE-B95A-87B8CBF7FA69}" type="presOf" srcId="{154746DB-D8A0-4500-A125-4E2E98FDDA84}" destId="{FA9B5342-CFD8-41A5-A237-88439EF2F93A}" srcOrd="0" destOrd="0" presId="urn:microsoft.com/office/officeart/2005/8/layout/hierarchy2"/>
-    <dgm:cxn modelId="{4F86295A-BC28-4DF0-9EC0-A3E0C7C54E4A}" srcId="{D647D25A-0F34-4670-8C59-23BA0A9B4939}" destId="{C3257D7D-F64B-4E69-A9B0-D8C985940F1F}" srcOrd="1" destOrd="0" parTransId="{C2CD1A7A-A3F9-4A81-A673-D57E0723DFFF}" sibTransId="{DCDDB9F9-7FC7-41ED-AF63-F5984A76F9BD}"/>
-    <dgm:cxn modelId="{F99A2988-F6F7-4C52-A2FF-7C24E68123BD}" type="presOf" srcId="{57EC5317-5FDC-4F2E-810C-627F1F951152}" destId="{BF22C11F-0D4F-45AC-9269-8FD185C31046}" srcOrd="1" destOrd="0" presId="urn:microsoft.com/office/officeart/2005/8/layout/hierarchy2"/>
+    <dgm:cxn modelId="{590A7A70-617C-466B-8F49-2F3297618C1D}" type="presOf" srcId="{321B2CF3-9BFD-4143-9FDE-0BB43B55AB36}" destId="{C74F4080-0AA8-42AD-9713-3267D187E33A}" srcOrd="0" destOrd="0" presId="urn:microsoft.com/office/officeart/2005/8/layout/hierarchy2"/>
     <dgm:cxn modelId="{96741BED-D208-4D2E-80D0-FF5679D60E32}" type="presOf" srcId="{C2CD1A7A-A3F9-4A81-A673-D57E0723DFFF}" destId="{34925CBB-BB0E-4B56-ACDB-C26C81A7A2C9}" srcOrd="1" destOrd="0" presId="urn:microsoft.com/office/officeart/2005/8/layout/hierarchy2"/>
-    <dgm:cxn modelId="{73D787C6-5107-413D-BB7F-A65162A85783}" srcId="{9D097639-AD92-495A-BFB3-501A8B7B590B}" destId="{3DC0F2F4-7FEE-4DB8-82DB-D2459B76649C}" srcOrd="1" destOrd="0" parTransId="{E358B682-132B-4448-8199-98731FF907A8}" sibTransId="{B5049162-CCAD-4D24-A40B-AE25F766430A}"/>
-    <dgm:cxn modelId="{10B35AF2-A325-4815-BB89-ABC2DB5C07F4}" type="presOf" srcId="{ADB94EBC-B4DC-404A-9A26-926C15DEDBB5}" destId="{B3A9A8FF-01B5-4CBF-8B26-37E84CD7D97A}" srcOrd="0" destOrd="0" presId="urn:microsoft.com/office/officeart/2005/8/layout/hierarchy2"/>
-    <dgm:cxn modelId="{6A79B6AB-3640-4A18-BEC0-5E6F63916F06}" type="presOf" srcId="{B7D90682-8C49-4D62-BC4C-E307E77EFF0C}" destId="{2E985369-B2D4-47A6-8D0A-9FF2A3183FAF}" srcOrd="0" destOrd="0" presId="urn:microsoft.com/office/officeart/2005/8/layout/hierarchy2"/>
-    <dgm:cxn modelId="{46243D58-6503-4444-BD3C-99829AEC32CC}" type="presOf" srcId="{D15A0EEA-7FCA-4DF5-8D88-E59A0BBF70A0}" destId="{4A7EBEA2-AB2A-4D6E-83DD-8773CCFB1790}" srcOrd="0" destOrd="0" presId="urn:microsoft.com/office/officeart/2005/8/layout/hierarchy2"/>
-    <dgm:cxn modelId="{AE47037D-A249-49EF-AD43-4AF49D8F00B7}" type="presOf" srcId="{E09C58EE-205F-4A6E-8A9C-3AA838C18B26}" destId="{4F864D02-32F8-4570-B8B4-CB6EA9AD16F4}" srcOrd="0" destOrd="0" presId="urn:microsoft.com/office/officeart/2005/8/layout/hierarchy2"/>
-    <dgm:cxn modelId="{7478389B-9A78-4EB0-8B32-A8B27DC0A58D}" type="presOf" srcId="{D15A0EEA-7FCA-4DF5-8D88-E59A0BBF70A0}" destId="{6BE64609-C9E1-461A-8AAB-1B9C46C77059}" srcOrd="1" destOrd="0" presId="urn:microsoft.com/office/officeart/2005/8/layout/hierarchy2"/>
-    <dgm:cxn modelId="{13C76CC4-9C6C-4B5E-9987-6BC27616BFF3}" type="presOf" srcId="{3DC0F2F4-7FEE-4DB8-82DB-D2459B76649C}" destId="{BFC8E187-1C0A-4835-BB28-66711531D03F}" srcOrd="0" destOrd="0" presId="urn:microsoft.com/office/officeart/2005/8/layout/hierarchy2"/>
-    <dgm:cxn modelId="{DCD2AA85-EBF4-4FBD-BCF4-805B2AFAFC24}" srcId="{3DC0F2F4-7FEE-4DB8-82DB-D2459B76649C}" destId="{ECBBADDE-B3CF-416C-B24B-85E7824F361E}" srcOrd="3" destOrd="0" parTransId="{423A31C6-514D-4BE5-9EBB-8EC7769AEF01}" sibTransId="{B08863CA-1C2C-4A85-BAF9-A1C663BA92B3}"/>
-    <dgm:cxn modelId="{5E8A3E1D-9829-4A4E-B9ED-BFF3E64016DA}" type="presOf" srcId="{721D8E6D-DA6C-4BE2-B0B4-61633B8AAB5C}" destId="{2C879F3D-6FAF-41DF-86BE-8AB6848B423C}" srcOrd="1" destOrd="0" presId="urn:microsoft.com/office/officeart/2005/8/layout/hierarchy2"/>
-    <dgm:cxn modelId="{267A9D28-12E8-4685-8692-633F4CB70FA7}" type="presOf" srcId="{721D8E6D-DA6C-4BE2-B0B4-61633B8AAB5C}" destId="{A0F9F019-80E5-44DA-9AA9-CB8501307925}" srcOrd="0" destOrd="0" presId="urn:microsoft.com/office/officeart/2005/8/layout/hierarchy2"/>
-    <dgm:cxn modelId="{1606B544-07D3-4EC1-9A3F-76BF5AEED639}" srcId="{3DC0F2F4-7FEE-4DB8-82DB-D2459B76649C}" destId="{B7D90682-8C49-4D62-BC4C-E307E77EFF0C}" srcOrd="0" destOrd="0" parTransId="{A10B55BC-6984-4C19-B5EA-A1A2702BD90C}" sibTransId="{D0DDCDC0-0D34-46F8-84B8-A11ED79202D8}"/>
-    <dgm:cxn modelId="{7687FB8D-6C3D-40A7-BA30-DFCD7FDFE9AC}" type="presOf" srcId="{C2CD1A7A-A3F9-4A81-A673-D57E0723DFFF}" destId="{0E85FF7D-408D-4251-9E74-C772FB887E90}" srcOrd="0" destOrd="0" presId="urn:microsoft.com/office/officeart/2005/8/layout/hierarchy2"/>
-    <dgm:cxn modelId="{A59EA14B-9238-4FBE-9990-5A38F0DFC22E}" srcId="{F20BD17E-E5FA-485D-AC44-2B89B6FCC443}" destId="{321B2CF3-9BFD-4143-9FDE-0BB43B55AB36}" srcOrd="0" destOrd="0" parTransId="{19E95A2F-1DAA-48F2-B7FD-92D4403DFE3B}" sibTransId="{73335CAA-F43E-4676-82C4-E4DE83E9B8AC}"/>
-    <dgm:cxn modelId="{21079303-D87E-438E-978C-DD75F0B270BB}" type="presOf" srcId="{476D38AA-EEE8-41BF-8749-7DBA59123A9E}" destId="{684C32BA-1D89-46B5-A84B-C9EE3DA78CE0}" srcOrd="1" destOrd="0" presId="urn:microsoft.com/office/officeart/2005/8/layout/hierarchy2"/>
-    <dgm:cxn modelId="{825685EF-2145-48EB-A0AA-7E914F476BB0}" type="presOf" srcId="{F20BD17E-E5FA-485D-AC44-2B89B6FCC443}" destId="{93A12725-4617-4C45-BEB1-D43F16484142}" srcOrd="0" destOrd="0" presId="urn:microsoft.com/office/officeart/2005/8/layout/hierarchy2"/>
-    <dgm:cxn modelId="{38E31C0D-AFCD-4338-AD8A-68F37C6D96A8}" type="presOf" srcId="{154746DB-D8A0-4500-A125-4E2E98FDDA84}" destId="{DF0C410B-ED64-4847-81D7-4933087A2B10}" srcOrd="1" destOrd="0" presId="urn:microsoft.com/office/officeart/2005/8/layout/hierarchy2"/>
-    <dgm:cxn modelId="{2FCB3698-115C-40FB-9ABC-50E26E88A7B2}" type="presOf" srcId="{F888A930-3168-49AD-8386-321FF276C0A1}" destId="{C504F8F9-0A44-4A1E-B820-4EAC7A3F5A9B}" srcOrd="1" destOrd="0" presId="urn:microsoft.com/office/officeart/2005/8/layout/hierarchy2"/>
-    <dgm:cxn modelId="{FCAF2E1A-5F2B-42D2-897E-A839DD930B9F}" type="presOf" srcId="{D98EC7ED-759E-4CB6-BCC0-652372340DD0}" destId="{95F52E24-B3DD-4A91-93E0-B0A565F84F68}" srcOrd="0" destOrd="0" presId="urn:microsoft.com/office/officeart/2005/8/layout/hierarchy2"/>
-    <dgm:cxn modelId="{E6B8561B-E5A3-4090-8562-FA678A2581B0}" srcId="{D7716EDA-20F9-4FAB-B7D1-38101357E949}" destId="{9D097639-AD92-495A-BFB3-501A8B7B590B}" srcOrd="0" destOrd="0" parTransId="{2294DED9-1EC7-4A8F-9EC3-177261F2F57E}" sibTransId="{1B5E60FB-22BE-4EBE-81AD-81B512FEE320}"/>
-    <dgm:cxn modelId="{21F8278B-BA96-4B5B-85F3-AE9D223041E7}" type="presOf" srcId="{CBEAA09E-BEA6-49DF-B3DC-69DEDC5F5DD7}" destId="{A4595CB8-0FC0-4BE0-9D3B-3BE04EB7F4DB}" srcOrd="0" destOrd="0" presId="urn:microsoft.com/office/officeart/2005/8/layout/hierarchy2"/>
-    <dgm:cxn modelId="{0B0FFCA0-0093-43A7-A8B7-7631794B2EC5}" type="presOf" srcId="{D7716EDA-20F9-4FAB-B7D1-38101357E949}" destId="{79955F60-58CD-4F80-B62D-6DE8B9A825CF}" srcOrd="0" destOrd="0" presId="urn:microsoft.com/office/officeart/2005/8/layout/hierarchy2"/>
-    <dgm:cxn modelId="{CB4602C9-A5E7-4A0E-964C-02574C1273C6}" type="presOf" srcId="{8BC2EAFB-020F-432E-8685-01B48095D60D}" destId="{1DD05888-22D7-4E8D-941B-301D0913B303}" srcOrd="0" destOrd="0" presId="urn:microsoft.com/office/officeart/2005/8/layout/hierarchy2"/>
-    <dgm:cxn modelId="{EB307024-2D0C-4655-AC43-39C026BC81A6}" srcId="{F20BD17E-E5FA-485D-AC44-2B89B6FCC443}" destId="{CBEAA09E-BEA6-49DF-B3DC-69DEDC5F5DD7}" srcOrd="1" destOrd="0" parTransId="{6F8AD765-1CB1-44CA-8FBC-F9BBA68B56E1}" sibTransId="{6E4A70AC-1EC4-4A83-A3D2-E5D813B3E7E5}"/>
-    <dgm:cxn modelId="{7F719DDC-59F9-4BBE-86D6-0F88EEA3ED60}" srcId="{F20BD17E-E5FA-485D-AC44-2B89B6FCC443}" destId="{D98EC7ED-759E-4CB6-BCC0-652372340DD0}" srcOrd="2" destOrd="0" parTransId="{8FB553AC-2415-4269-8C91-39D08E223E46}" sibTransId="{E180ACA5-F993-4C1D-924C-1F9FDEB71E76}"/>
+    <dgm:cxn modelId="{AEAEE337-5E34-4AF2-9C38-BD56FD5DAE30}" type="presOf" srcId="{F888A930-3168-49AD-8386-321FF276C0A1}" destId="{6F2EE422-9069-4D95-AC54-C74B17975695}" srcOrd="0" destOrd="0" presId="urn:microsoft.com/office/officeart/2005/8/layout/hierarchy2"/>
     <dgm:cxn modelId="{462EC84F-5EA3-487A-AD74-5D0779F953D0}" type="presOf" srcId="{423A31C6-514D-4BE5-9EBB-8EC7769AEF01}" destId="{EDC2AFF2-6670-4332-A50F-E6828E98AEEA}" srcOrd="0" destOrd="0" presId="urn:microsoft.com/office/officeart/2005/8/layout/hierarchy2"/>
     <dgm:cxn modelId="{13391F7C-02F7-4479-8A66-8FFEC2C3E50A}" type="presOf" srcId="{8FB553AC-2415-4269-8C91-39D08E223E46}" destId="{13A06A46-3305-45B6-9D65-A138919969F1}" srcOrd="1" destOrd="0" presId="urn:microsoft.com/office/officeart/2005/8/layout/hierarchy2"/>
+    <dgm:cxn modelId="{EB307024-2D0C-4655-AC43-39C026BC81A6}" srcId="{F20BD17E-E5FA-485D-AC44-2B89B6FCC443}" destId="{CBEAA09E-BEA6-49DF-B3DC-69DEDC5F5DD7}" srcOrd="1" destOrd="0" parTransId="{6F8AD765-1CB1-44CA-8FBC-F9BBA68B56E1}" sibTransId="{6E4A70AC-1EC4-4A83-A3D2-E5D813B3E7E5}"/>
     <dgm:cxn modelId="{4AE60224-D4DC-4E5A-9418-8D108ABCC939}" type="presOf" srcId="{C3257D7D-F64B-4E69-A9B0-D8C985940F1F}" destId="{EF0E89F2-A0C3-4CCE-96FA-87E21DBB018E}" srcOrd="0" destOrd="0" presId="urn:microsoft.com/office/officeart/2005/8/layout/hierarchy2"/>
-    <dgm:cxn modelId="{AEAEE337-5E34-4AF2-9C38-BD56FD5DAE30}" type="presOf" srcId="{F888A930-3168-49AD-8386-321FF276C0A1}" destId="{6F2EE422-9069-4D95-AC54-C74B17975695}" srcOrd="0" destOrd="0" presId="urn:microsoft.com/office/officeart/2005/8/layout/hierarchy2"/>
-    <dgm:cxn modelId="{C878CE1B-CD01-4D2C-8B51-3FB59E30E58F}" type="presOf" srcId="{6F8AD765-1CB1-44CA-8FBC-F9BBA68B56E1}" destId="{5CB5FE40-D36D-40F4-A014-7933BF077F9B}" srcOrd="0" destOrd="0" presId="urn:microsoft.com/office/officeart/2005/8/layout/hierarchy2"/>
+    <dgm:cxn modelId="{2FCB3698-115C-40FB-9ABC-50E26E88A7B2}" type="presOf" srcId="{F888A930-3168-49AD-8386-321FF276C0A1}" destId="{C504F8F9-0A44-4A1E-B820-4EAC7A3F5A9B}" srcOrd="1" destOrd="0" presId="urn:microsoft.com/office/officeart/2005/8/layout/hierarchy2"/>
+    <dgm:cxn modelId="{662B0DAF-CF29-4A2F-9CEB-EF68B3231DFD}" type="presOf" srcId="{E358B682-132B-4448-8199-98731FF907A8}" destId="{7717090A-5638-4A41-B564-1906ED06751F}" srcOrd="1" destOrd="0" presId="urn:microsoft.com/office/officeart/2005/8/layout/hierarchy2"/>
+    <dgm:cxn modelId="{CCA83B69-ABE5-40D5-86AC-30CA2C0F25CB}" type="presOf" srcId="{94EFE80F-AA5D-4311-AE62-3837F981B4CD}" destId="{07BFDBEE-4B3A-4C4B-BFFC-6D3B24FA768B}" srcOrd="0" destOrd="0" presId="urn:microsoft.com/office/officeart/2005/8/layout/hierarchy2"/>
+    <dgm:cxn modelId="{12A87CB4-ABD0-43BD-92FC-45D56C39B646}" srcId="{D647D25A-0F34-4670-8C59-23BA0A9B4939}" destId="{EA0207A9-04E4-4255-A27B-994ECB988C09}" srcOrd="0" destOrd="0" parTransId="{BF2576C9-890D-4A8B-855F-67BFF3C6A0B0}" sibTransId="{AEF683F9-F799-417F-A78B-C3EACD4D985C}"/>
+    <dgm:cxn modelId="{6A79B6AB-3640-4A18-BEC0-5E6F63916F06}" type="presOf" srcId="{B7D90682-8C49-4D62-BC4C-E307E77EFF0C}" destId="{2E985369-B2D4-47A6-8D0A-9FF2A3183FAF}" srcOrd="0" destOrd="0" presId="urn:microsoft.com/office/officeart/2005/8/layout/hierarchy2"/>
+    <dgm:cxn modelId="{F99A2988-F6F7-4C52-A2FF-7C24E68123BD}" type="presOf" srcId="{57EC5317-5FDC-4F2E-810C-627F1F951152}" destId="{BF22C11F-0D4F-45AC-9269-8FD185C31046}" srcOrd="1" destOrd="0" presId="urn:microsoft.com/office/officeart/2005/8/layout/hierarchy2"/>
+    <dgm:cxn modelId="{4F86295A-BC28-4DF0-9EC0-A3E0C7C54E4A}" srcId="{D647D25A-0F34-4670-8C59-23BA0A9B4939}" destId="{C3257D7D-F64B-4E69-A9B0-D8C985940F1F}" srcOrd="1" destOrd="0" parTransId="{C2CD1A7A-A3F9-4A81-A673-D57E0723DFFF}" sibTransId="{DCDDB9F9-7FC7-41ED-AF63-F5984A76F9BD}"/>
+    <dgm:cxn modelId="{7F719DDC-59F9-4BBE-86D6-0F88EEA3ED60}" srcId="{F20BD17E-E5FA-485D-AC44-2B89B6FCC443}" destId="{D98EC7ED-759E-4CB6-BCC0-652372340DD0}" srcOrd="2" destOrd="0" parTransId="{8FB553AC-2415-4269-8C91-39D08E223E46}" sibTransId="{E180ACA5-F993-4C1D-924C-1F9FDEB71E76}"/>
+    <dgm:cxn modelId="{B37FCC2A-E4C0-4686-A6B7-DF229C955E61}" type="presOf" srcId="{D647D25A-0F34-4670-8C59-23BA0A9B4939}" destId="{B65696F3-61D9-4989-9359-AA1CAD796701}" srcOrd="0" destOrd="0" presId="urn:microsoft.com/office/officeart/2005/8/layout/hierarchy2"/>
+    <dgm:cxn modelId="{2A0C67EE-9E7C-4593-926F-134381B3DB02}" srcId="{D647D25A-0F34-4670-8C59-23BA0A9B4939}" destId="{46F303BD-D8DF-4218-84DC-82D20CC9A872}" srcOrd="3" destOrd="0" parTransId="{476D38AA-EEE8-41BF-8749-7DBA59123A9E}" sibTransId="{AFED4044-180F-48F5-8644-5B8DC6F06744}"/>
+    <dgm:cxn modelId="{0B0FFCA0-0093-43A7-A8B7-7631794B2EC5}" type="presOf" srcId="{D7716EDA-20F9-4FAB-B7D1-38101357E949}" destId="{79955F60-58CD-4F80-B62D-6DE8B9A825CF}" srcOrd="0" destOrd="0" presId="urn:microsoft.com/office/officeart/2005/8/layout/hierarchy2"/>
+    <dgm:cxn modelId="{EAB82487-8C9A-4EDB-B0F9-51D4936AA3F9}" type="presOf" srcId="{6F8AD765-1CB1-44CA-8FBC-F9BBA68B56E1}" destId="{6CE67ACE-8C8B-4E40-94E2-9FD2E7292F87}" srcOrd="1" destOrd="0" presId="urn:microsoft.com/office/officeart/2005/8/layout/hierarchy2"/>
     <dgm:cxn modelId="{CC5FED9C-BC90-472D-9D0F-7E1B721EF633}" srcId="{9D097639-AD92-495A-BFB3-501A8B7B590B}" destId="{D647D25A-0F34-4670-8C59-23BA0A9B4939}" srcOrd="0" destOrd="0" parTransId="{F888A930-3168-49AD-8386-321FF276C0A1}" sibTransId="{B8D2B72C-A036-4204-9ACE-6A48C6265604}"/>
-    <dgm:cxn modelId="{7C811853-A9D1-49C9-A736-FD1502F93ECA}" type="presOf" srcId="{46F303BD-D8DF-4218-84DC-82D20CC9A872}" destId="{CE93C166-882D-4077-84D2-0F528447539C}" srcOrd="0" destOrd="0" presId="urn:microsoft.com/office/officeart/2005/8/layout/hierarchy2"/>
+    <dgm:cxn modelId="{9206D8DF-1665-4E7F-A76B-C70F170485F7}" type="presOf" srcId="{EA0207A9-04E4-4255-A27B-994ECB988C09}" destId="{940DB865-9134-49E2-BC49-EA3495840E23}" srcOrd="0" destOrd="0" presId="urn:microsoft.com/office/officeart/2005/8/layout/hierarchy2"/>
+    <dgm:cxn modelId="{10B35AF2-A325-4815-BB89-ABC2DB5C07F4}" type="presOf" srcId="{ADB94EBC-B4DC-404A-9A26-926C15DEDBB5}" destId="{B3A9A8FF-01B5-4CBF-8B26-37E84CD7D97A}" srcOrd="0" destOrd="0" presId="urn:microsoft.com/office/officeart/2005/8/layout/hierarchy2"/>
+    <dgm:cxn modelId="{5E919555-8C7D-41E2-8430-C8E3C3C743AA}" type="presOf" srcId="{ECBBADDE-B3CF-416C-B24B-85E7824F361E}" destId="{CE8CEF7E-4AA8-4BA7-82BC-8376E5C4DD40}" srcOrd="0" destOrd="0" presId="urn:microsoft.com/office/officeart/2005/8/layout/hierarchy2"/>
+    <dgm:cxn modelId="{46243D58-6503-4444-BD3C-99829AEC32CC}" type="presOf" srcId="{D15A0EEA-7FCA-4DF5-8D88-E59A0BBF70A0}" destId="{4A7EBEA2-AB2A-4D6E-83DD-8773CCFB1790}" srcOrd="0" destOrd="0" presId="urn:microsoft.com/office/officeart/2005/8/layout/hierarchy2"/>
+    <dgm:cxn modelId="{DCD2AA85-EBF4-4FBD-BCF4-805B2AFAFC24}" srcId="{3DC0F2F4-7FEE-4DB8-82DB-D2459B76649C}" destId="{ECBBADDE-B3CF-416C-B24B-85E7824F361E}" srcOrd="3" destOrd="0" parTransId="{423A31C6-514D-4BE5-9EBB-8EC7769AEF01}" sibTransId="{B08863CA-1C2C-4A85-BAF9-A1C663BA92B3}"/>
+    <dgm:cxn modelId="{AE47037D-A249-49EF-AD43-4AF49D8F00B7}" type="presOf" srcId="{E09C58EE-205F-4A6E-8A9C-3AA838C18B26}" destId="{4F864D02-32F8-4570-B8B4-CB6EA9AD16F4}" srcOrd="0" destOrd="0" presId="urn:microsoft.com/office/officeart/2005/8/layout/hierarchy2"/>
+    <dgm:cxn modelId="{5E8A3E1D-9829-4A4E-B9ED-BFF3E64016DA}" type="presOf" srcId="{721D8E6D-DA6C-4BE2-B0B4-61633B8AAB5C}" destId="{2C879F3D-6FAF-41DF-86BE-8AB6848B423C}" srcOrd="1" destOrd="0" presId="urn:microsoft.com/office/officeart/2005/8/layout/hierarchy2"/>
+    <dgm:cxn modelId="{7478389B-9A78-4EB0-8B32-A8B27DC0A58D}" type="presOf" srcId="{D15A0EEA-7FCA-4DF5-8D88-E59A0BBF70A0}" destId="{6BE64609-C9E1-461A-8AAB-1B9C46C77059}" srcOrd="1" destOrd="0" presId="urn:microsoft.com/office/officeart/2005/8/layout/hierarchy2"/>
+    <dgm:cxn modelId="{267A9D28-12E8-4685-8692-633F4CB70FA7}" type="presOf" srcId="{721D8E6D-DA6C-4BE2-B0B4-61633B8AAB5C}" destId="{A0F9F019-80E5-44DA-9AA9-CB8501307925}" srcOrd="0" destOrd="0" presId="urn:microsoft.com/office/officeart/2005/8/layout/hierarchy2"/>
+    <dgm:cxn modelId="{F57265DA-D2AA-4F0E-89A5-9FA03FFC168B}" type="presOf" srcId="{476D38AA-EEE8-41BF-8749-7DBA59123A9E}" destId="{04E3F8F1-6B3C-4E37-A25A-3F12466BFCA5}" srcOrd="0" destOrd="0" presId="urn:microsoft.com/office/officeart/2005/8/layout/hierarchy2"/>
+    <dgm:cxn modelId="{FCAF2E1A-5F2B-42D2-897E-A839DD930B9F}" type="presOf" srcId="{D98EC7ED-759E-4CB6-BCC0-652372340DD0}" destId="{95F52E24-B3DD-4A91-93E0-B0A565F84F68}" srcOrd="0" destOrd="0" presId="urn:microsoft.com/office/officeart/2005/8/layout/hierarchy2"/>
+    <dgm:cxn modelId="{CB4602C9-A5E7-4A0E-964C-02574C1273C6}" type="presOf" srcId="{8BC2EAFB-020F-432E-8685-01B48095D60D}" destId="{1DD05888-22D7-4E8D-941B-301D0913B303}" srcOrd="0" destOrd="0" presId="urn:microsoft.com/office/officeart/2005/8/layout/hierarchy2"/>
+    <dgm:cxn modelId="{73D787C6-5107-413D-BB7F-A65162A85783}" srcId="{9D097639-AD92-495A-BFB3-501A8B7B590B}" destId="{3DC0F2F4-7FEE-4DB8-82DB-D2459B76649C}" srcOrd="1" destOrd="0" parTransId="{E358B682-132B-4448-8199-98731FF907A8}" sibTransId="{B5049162-CCAD-4D24-A40B-AE25F766430A}"/>
+    <dgm:cxn modelId="{1606B544-07D3-4EC1-9A3F-76BF5AEED639}" srcId="{3DC0F2F4-7FEE-4DB8-82DB-D2459B76649C}" destId="{B7D90682-8C49-4D62-BC4C-E307E77EFF0C}" srcOrd="0" destOrd="0" parTransId="{A10B55BC-6984-4C19-B5EA-A1A2702BD90C}" sibTransId="{D0DDCDC0-0D34-46F8-84B8-A11ED79202D8}"/>
+    <dgm:cxn modelId="{C67C78E9-FFC3-421D-AAAE-CB9C6659AE2C}" type="presOf" srcId="{32A2791E-A72E-4517-85C9-B2A6282450EC}" destId="{8D9823FB-FE6E-45BE-84C7-56792F03D4C9}" srcOrd="0" destOrd="0" presId="urn:microsoft.com/office/officeart/2005/8/layout/hierarchy2"/>
     <dgm:cxn modelId="{AB098F85-3491-4C27-B0B6-3AC9B2EA8DF8}" type="presParOf" srcId="{79955F60-58CD-4F80-B62D-6DE8B9A825CF}" destId="{68061451-DC27-4B73-BE1D-86199483FC02}" srcOrd="0" destOrd="0" presId="urn:microsoft.com/office/officeart/2005/8/layout/hierarchy2"/>
     <dgm:cxn modelId="{A19C8B52-2271-478B-A284-AE7B3C4B72A3}" type="presParOf" srcId="{68061451-DC27-4B73-BE1D-86199483FC02}" destId="{90297072-4BF8-4741-B486-6ED433102DCF}" srcOrd="0" destOrd="0" presId="urn:microsoft.com/office/officeart/2005/8/layout/hierarchy2"/>
     <dgm:cxn modelId="{42D2CBD2-B2F4-4854-BB2C-0E1B6345252B}" type="presParOf" srcId="{68061451-DC27-4B73-BE1D-86199483FC02}" destId="{66B09D7C-958C-486F-B2C5-F2594EBFE797}" srcOrd="1" destOrd="0" presId="urn:microsoft.com/office/officeart/2005/8/layout/hierarchy2"/>
@@ -2871,14 +2871,14 @@
   <dgm:whole/>
   <dgm:extLst>
     <a:ext uri="http://schemas.microsoft.com/office/drawing/2008/diagram">
-      <dsp:dataModelExt xmlns:dsp="http://schemas.microsoft.com/office/drawing/2008/diagram" xmlns="" relId="rId7" minVer="http://schemas.openxmlformats.org/drawingml/2006/diagram"/>
+      <dsp:dataModelExt xmlns:dsp="http://schemas.microsoft.com/office/drawing/2008/diagram" relId="rId7" minVer="http://schemas.openxmlformats.org/drawingml/2006/diagram"/>
     </a:ext>
   </dgm:extLst>
 </dgm:dataModel>
 </file>
 
 <file path=ppt/diagrams/drawing1.xml><?xml version="1.0" encoding="utf-8"?>
-<dsp:drawing xmlns:dgm="http://schemas.openxmlformats.org/drawingml/2006/diagram" xmlns:a="http://schemas.openxmlformats.org/drawingml/2006/main" xmlns:dsp="http://schemas.microsoft.com/office/drawing/2008/diagram">
+<dsp:drawing xmlns:dgm="http://schemas.openxmlformats.org/drawingml/2006/diagram" xmlns:dsp="http://schemas.microsoft.com/office/drawing/2008/diagram" xmlns:a="http://schemas.openxmlformats.org/drawingml/2006/main">
   <dsp:spTree>
     <dsp:nvGrpSpPr>
       <dsp:cNvPr id="0" name=""/>
@@ -2967,8 +2967,8 @@
         </a:p>
       </dsp:txBody>
       <dsp:txXfrm>
-        <a:off x="0" y="2233811"/>
-        <a:ext cx="1410906" cy="705453"/>
+        <a:off x="20662" y="2254473"/>
+        <a:ext cx="1369582" cy="664129"/>
       </dsp:txXfrm>
     </dsp:sp>
     <dsp:sp modelId="{6F2EE422-9069-4D95-AC54-C74B17975695}">
@@ -3045,7 +3045,7 @@
           <a:endParaRPr lang="es-ES" sz="500" kern="1200"/>
         </a:p>
       </dsp:txBody>
-      <dsp:txXfrm rot="16445860">
+      <dsp:txXfrm>
         <a:off x="1422967" y="1997773"/>
         <a:ext cx="56209" cy="56209"/>
       </dsp:txXfrm>
@@ -3149,8 +3149,8 @@
         </a:p>
       </dsp:txBody>
       <dsp:txXfrm>
-        <a:off x="1491237" y="1013170"/>
-        <a:ext cx="1806722" cy="904094"/>
+        <a:off x="1517717" y="1039650"/>
+        <a:ext cx="1753762" cy="851134"/>
       </dsp:txXfrm>
     </dsp:sp>
     <dsp:sp modelId="{EE6DA4A3-BC98-4A40-A971-73D75F87805F}">
@@ -3227,7 +3227,7 @@
           <a:endParaRPr lang="es-ES" sz="500" kern="1200"/>
         </a:p>
       </dsp:txBody>
-      <dsp:txXfrm rot="18054061">
+      <dsp:txXfrm>
         <a:off x="3580444" y="911863"/>
         <a:ext cx="60938" cy="60938"/>
       </dsp:txXfrm>
@@ -3314,8 +3314,8 @@
         </a:p>
       </dsp:txBody>
       <dsp:txXfrm>
-        <a:off x="3923866" y="66720"/>
-        <a:ext cx="1410906" cy="705453"/>
+        <a:off x="3944528" y="87382"/>
+        <a:ext cx="1369582" cy="664129"/>
       </dsp:txXfrm>
     </dsp:sp>
     <dsp:sp modelId="{0E85FF7D-408D-4251-9E74-C772FB887E90}">
@@ -3392,7 +3392,7 @@
           <a:endParaRPr lang="es-ES" sz="500" kern="1200"/>
         </a:p>
       </dsp:txBody>
-      <dsp:txXfrm rot="20030609">
+      <dsp:txXfrm>
         <a:off x="3593480" y="1294088"/>
         <a:ext cx="34865" cy="34865"/>
       </dsp:txXfrm>
@@ -3479,8 +3479,8 @@
         </a:p>
       </dsp:txBody>
       <dsp:txXfrm>
-        <a:off x="3923866" y="805097"/>
-        <a:ext cx="1410906" cy="705453"/>
+        <a:off x="3944528" y="825759"/>
+        <a:ext cx="1369582" cy="664129"/>
       </dsp:txXfrm>
     </dsp:sp>
     <dsp:sp modelId="{FA9B5342-CFD8-41A5-A237-88439EF2F93A}">
@@ -3557,7 +3557,7 @@
           <a:endParaRPr lang="es-CO" sz="500" kern="1200"/>
         </a:p>
       </dsp:txBody>
-      <dsp:txXfrm rot="18988166">
+      <dsp:txXfrm>
         <a:off x="5729294" y="726051"/>
         <a:ext cx="58446" cy="58446"/>
       </dsp:txXfrm>
@@ -3656,8 +3656,8 @@
         </a:p>
       </dsp:txBody>
       <dsp:txXfrm>
-        <a:off x="6182262" y="0"/>
-        <a:ext cx="1273554" cy="705453"/>
+        <a:off x="6202924" y="20662"/>
+        <a:ext cx="1232230" cy="664129"/>
       </dsp:txXfrm>
     </dsp:sp>
     <dsp:sp modelId="{07BFDBEE-4B3A-4C4B-BFFC-6D3B24FA768B}">
@@ -3734,7 +3734,7 @@
           <a:endParaRPr lang="es-CO" sz="500" kern="1200"/>
         </a:p>
       </dsp:txBody>
-      <dsp:txXfrm rot="21399178">
+      <dsp:txXfrm>
         <a:off x="5708887" y="1115065"/>
         <a:ext cx="39451" cy="39451"/>
       </dsp:txXfrm>
@@ -3833,8 +3833,8 @@
         </a:p>
       </dsp:txBody>
       <dsp:txXfrm>
-        <a:off x="6122453" y="759031"/>
-        <a:ext cx="1410906" cy="705453"/>
+        <a:off x="6143115" y="779693"/>
+        <a:ext cx="1369582" cy="664129"/>
       </dsp:txXfrm>
     </dsp:sp>
     <dsp:sp modelId="{8D9823FB-FE6E-45BE-84C7-56792F03D4C9}">
@@ -3911,7 +3911,7 @@
           <a:endParaRPr lang="es-CO" sz="500" kern="1200"/>
         </a:p>
       </dsp:txBody>
-      <dsp:txXfrm rot="2549691">
+      <dsp:txXfrm>
         <a:off x="5694587" y="1485278"/>
         <a:ext cx="52348" cy="52348"/>
       </dsp:txXfrm>
@@ -4003,8 +4003,8 @@
         </a:p>
       </dsp:txBody>
       <dsp:txXfrm>
-        <a:off x="6106750" y="1512356"/>
-        <a:ext cx="1410906" cy="705453"/>
+        <a:off x="6127412" y="1533018"/>
+        <a:ext cx="1369582" cy="664129"/>
       </dsp:txXfrm>
     </dsp:sp>
     <dsp:sp modelId="{A0F9F019-80E5-44DA-9AA9-CB8501307925}">
@@ -4081,7 +4081,7 @@
           <a:endParaRPr lang="es-ES" sz="500" kern="1200"/>
         </a:p>
       </dsp:txBody>
-      <dsp:txXfrm rot="2178950">
+      <dsp:txXfrm>
         <a:off x="3591493" y="1675818"/>
         <a:ext cx="38839" cy="38839"/>
       </dsp:txXfrm>
@@ -4168,8 +4168,8 @@
         </a:p>
       </dsp:txBody>
       <dsp:txXfrm>
-        <a:off x="3923866" y="1572531"/>
-        <a:ext cx="1410906" cy="705453"/>
+        <a:off x="3944528" y="1593193"/>
+        <a:ext cx="1369582" cy="664129"/>
       </dsp:txXfrm>
     </dsp:sp>
     <dsp:sp modelId="{04E3F8F1-6B3C-4E37-A25A-3F12466BFCA5}">
@@ -4246,7 +4246,7 @@
           <a:endParaRPr lang="es-ES" sz="500" kern="1200"/>
         </a:p>
       </dsp:txBody>
-      <dsp:txXfrm rot="3720780">
+      <dsp:txXfrm>
         <a:off x="3577568" y="2020775"/>
         <a:ext cx="66689" cy="66689"/>
       </dsp:txXfrm>
@@ -4333,8 +4333,8 @@
         </a:p>
       </dsp:txBody>
       <dsp:txXfrm>
-        <a:off x="3923866" y="2290294"/>
-        <a:ext cx="1410906" cy="705453"/>
+        <a:off x="3944528" y="2310956"/>
+        <a:ext cx="1369582" cy="664129"/>
       </dsp:txXfrm>
     </dsp:sp>
     <dsp:sp modelId="{EDFE39FD-83D6-41C3-B6C7-F60ABD8B37F2}">
@@ -4411,7 +4411,7 @@
           <a:endParaRPr lang="es-ES" sz="600" kern="1200"/>
         </a:p>
       </dsp:txBody>
-      <dsp:txXfrm rot="5177663">
+      <dsp:txXfrm>
         <a:off x="1425091" y="3505588"/>
         <a:ext cx="96955" cy="96955"/>
       </dsp:txXfrm>
@@ -4515,8 +4515,8 @@
         </a:p>
       </dsp:txBody>
       <dsp:txXfrm>
-        <a:off x="1536231" y="4131573"/>
-        <a:ext cx="1806722" cy="780040"/>
+        <a:off x="1559078" y="4154420"/>
+        <a:ext cx="1761028" cy="734346"/>
       </dsp:txXfrm>
     </dsp:sp>
     <dsp:sp modelId="{8A70ADEC-3769-486F-9739-921FC2767A18}">
@@ -4593,7 +4593,7 @@
           <a:endParaRPr lang="es-ES" sz="500" kern="1200"/>
         </a:p>
       </dsp:txBody>
-      <dsp:txXfrm rot="18169138">
+      <dsp:txXfrm>
         <a:off x="3620600" y="4019115"/>
         <a:ext cx="56433" cy="56433"/>
       </dsp:txXfrm>
@@ -4680,8 +4680,8 @@
         </a:p>
       </dsp:txBody>
       <dsp:txXfrm>
-        <a:off x="3954680" y="3220343"/>
-        <a:ext cx="1410906" cy="705453"/>
+        <a:off x="3975342" y="3241005"/>
+        <a:ext cx="1369582" cy="664129"/>
       </dsp:txXfrm>
     </dsp:sp>
     <dsp:sp modelId="{D3680F41-1195-4452-BBEE-962B4F5BC9B1}">
@@ -4758,7 +4758,7 @@
           <a:endParaRPr lang="es-ES" sz="500" kern="1200"/>
         </a:p>
       </dsp:txBody>
-      <dsp:txXfrm rot="20991891">
+      <dsp:txXfrm>
         <a:off x="3633281" y="4451382"/>
         <a:ext cx="31071" cy="31071"/>
       </dsp:txXfrm>
@@ -4845,8 +4845,8 @@
         </a:p>
       </dsp:txBody>
       <dsp:txXfrm>
-        <a:off x="3954680" y="4031614"/>
-        <a:ext cx="1410906" cy="761254"/>
+        <a:off x="3976976" y="4053910"/>
+        <a:ext cx="1366314" cy="716662"/>
       </dsp:txXfrm>
     </dsp:sp>
     <dsp:sp modelId="{91665B73-CCEB-45BE-9AB3-26A213CB8A2E}">
@@ -4923,7 +4923,7 @@
           <a:endParaRPr lang="es-CO" sz="500" kern="1200"/>
         </a:p>
       </dsp:txBody>
-      <dsp:txXfrm rot="19160585">
+      <dsp:txXfrm>
         <a:off x="5860055" y="3922725"/>
         <a:ext cx="69778" cy="69778"/>
       </dsp:txXfrm>
@@ -5022,8 +5022,8 @@
         </a:p>
       </dsp:txBody>
       <dsp:txXfrm>
-        <a:off x="6424303" y="3150260"/>
-        <a:ext cx="1639812" cy="705453"/>
+        <a:off x="6444965" y="3170922"/>
+        <a:ext cx="1598488" cy="664129"/>
       </dsp:txXfrm>
     </dsp:sp>
     <dsp:sp modelId="{5CB5FE40-D36D-40F4-A014-7933BF077F9B}">
@@ -5100,7 +5100,7 @@
           <a:endParaRPr lang="es-CO" sz="500" kern="1200"/>
         </a:p>
       </dsp:txBody>
-      <dsp:txXfrm rot="21455688">
+      <dsp:txXfrm>
         <a:off x="5858227" y="4364506"/>
         <a:ext cx="51905" cy="51905"/>
       </dsp:txXfrm>
@@ -5209,8 +5209,8 @@
         </a:p>
       </dsp:txBody>
       <dsp:txXfrm>
-        <a:off x="6402772" y="4015950"/>
-        <a:ext cx="1630697" cy="705453"/>
+        <a:off x="6423434" y="4036612"/>
+        <a:ext cx="1589373" cy="664129"/>
       </dsp:txXfrm>
     </dsp:sp>
     <dsp:sp modelId="{0DA00C24-AADE-4C9A-A625-E4BDB19BA90C}">
@@ -5287,7 +5287,7 @@
           <a:endParaRPr lang="es-CO" sz="500" kern="1200"/>
         </a:p>
       </dsp:txBody>
-      <dsp:txXfrm rot="2341007">
+      <dsp:txXfrm>
         <a:off x="5850806" y="4799068"/>
         <a:ext cx="66746" cy="66746"/>
       </dsp:txXfrm>
@@ -5386,8 +5386,8 @@
         </a:p>
       </dsp:txBody>
       <dsp:txXfrm>
-        <a:off x="6402772" y="4827277"/>
-        <a:ext cx="1639812" cy="850727"/>
+        <a:off x="6427689" y="4852194"/>
+        <a:ext cx="1589978" cy="800893"/>
       </dsp:txXfrm>
     </dsp:sp>
     <dsp:sp modelId="{4A7EBEA2-AB2A-4D6E-83DD-8773CCFB1790}">
@@ -5464,7 +5464,7 @@
           <a:endParaRPr lang="es-ES" sz="500" kern="1200"/>
         </a:p>
       </dsp:txBody>
-      <dsp:txXfrm rot="2810394">
+      <dsp:txXfrm>
         <a:off x="3626460" y="4825403"/>
         <a:ext cx="44714" cy="44714"/>
       </dsp:txXfrm>
@@ -5551,8 +5551,8 @@
         </a:p>
       </dsp:txBody>
       <dsp:txXfrm>
-        <a:off x="3954680" y="4872994"/>
-        <a:ext cx="1410906" cy="601864"/>
+        <a:off x="3972308" y="4890622"/>
+        <a:ext cx="1375650" cy="566608"/>
       </dsp:txXfrm>
     </dsp:sp>
     <dsp:sp modelId="{EDC2AFF2-6670-4332-A50F-E6828E98AEEA}">
@@ -5629,7 +5629,7 @@
           <a:endParaRPr lang="es-ES" sz="500" kern="1200"/>
         </a:p>
       </dsp:txBody>
-      <dsp:txXfrm rot="3979913">
+      <dsp:txXfrm>
         <a:off x="3610721" y="5181329"/>
         <a:ext cx="76191" cy="76191"/>
       </dsp:txXfrm>
@@ -5716,8 +5716,8 @@
         </a:p>
       </dsp:txBody>
       <dsp:txXfrm>
-        <a:off x="3954680" y="5564529"/>
-        <a:ext cx="1410906" cy="705453"/>
+        <a:off x="3975342" y="5585191"/>
+        <a:ext cx="1369582" cy="664129"/>
       </dsp:txXfrm>
     </dsp:sp>
   </dsp:spTree>
@@ -7161,7 +7161,7 @@
             <a:fld id="{09C12D80-4AA6-4CE2-B9C2-0D22F5217B91}" type="datetimeFigureOut">
               <a:rPr lang="es-ES" smtClean="0"/>
               <a:pPr/>
-              <a:t>03/03/2014</a:t>
+              <a:t>06/05/2014</a:t>
             </a:fld>
             <a:endParaRPr lang="es-ES"/>
           </a:p>
@@ -7332,7 +7332,7 @@
     </p:spTree>
     <p:extLst>
       <p:ext uri="{BB962C8B-B14F-4D97-AF65-F5344CB8AC3E}">
-        <p14:creationId xmlns:p14="http://schemas.microsoft.com/office/powerpoint/2010/main" xmlns="" val="1461873376"/>
+        <p14:creationId xmlns:p14="http://schemas.microsoft.com/office/powerpoint/2010/main" val="1461873376"/>
       </p:ext>
     </p:extLst>
   </p:cSld>
@@ -8188,7 +8188,7 @@
             <a:fld id="{05D96BC6-CE97-46CE-B948-1334CFE89D44}" type="datetimeFigureOut">
               <a:rPr lang="es-ES" smtClean="0"/>
               <a:pPr/>
-              <a:t>03/03/2014</a:t>
+              <a:t>06/05/2014</a:t>
             </a:fld>
             <a:endParaRPr lang="es-ES"/>
           </a:p>
@@ -8355,7 +8355,7 @@
             <a:fld id="{05D96BC6-CE97-46CE-B948-1334CFE89D44}" type="datetimeFigureOut">
               <a:rPr lang="es-ES" smtClean="0"/>
               <a:pPr/>
-              <a:t>03/03/2014</a:t>
+              <a:t>06/05/2014</a:t>
             </a:fld>
             <a:endParaRPr lang="es-ES"/>
           </a:p>
@@ -8532,7 +8532,7 @@
             <a:fld id="{05D96BC6-CE97-46CE-B948-1334CFE89D44}" type="datetimeFigureOut">
               <a:rPr lang="es-ES" smtClean="0"/>
               <a:pPr/>
-              <a:t>03/03/2014</a:t>
+              <a:t>06/05/2014</a:t>
             </a:fld>
             <a:endParaRPr lang="es-ES"/>
           </a:p>
@@ -8699,7 +8699,7 @@
             <a:fld id="{05D96BC6-CE97-46CE-B948-1334CFE89D44}" type="datetimeFigureOut">
               <a:rPr lang="es-ES" smtClean="0"/>
               <a:pPr/>
-              <a:t>03/03/2014</a:t>
+              <a:t>06/05/2014</a:t>
             </a:fld>
             <a:endParaRPr lang="es-ES"/>
           </a:p>
@@ -8966,7 +8966,7 @@
             <a:fld id="{05D96BC6-CE97-46CE-B948-1334CFE89D44}" type="datetimeFigureOut">
               <a:rPr lang="es-ES" smtClean="0"/>
               <a:pPr/>
-              <a:t>03/03/2014</a:t>
+              <a:t>06/05/2014</a:t>
             </a:fld>
             <a:endParaRPr lang="es-ES"/>
           </a:p>
@@ -9251,7 +9251,7 @@
             <a:fld id="{05D96BC6-CE97-46CE-B948-1334CFE89D44}" type="datetimeFigureOut">
               <a:rPr lang="es-ES" smtClean="0"/>
               <a:pPr/>
-              <a:t>03/03/2014</a:t>
+              <a:t>06/05/2014</a:t>
             </a:fld>
             <a:endParaRPr lang="es-ES"/>
           </a:p>
@@ -9670,7 +9670,7 @@
             <a:fld id="{05D96BC6-CE97-46CE-B948-1334CFE89D44}" type="datetimeFigureOut">
               <a:rPr lang="es-ES" smtClean="0"/>
               <a:pPr/>
-              <a:t>03/03/2014</a:t>
+              <a:t>06/05/2014</a:t>
             </a:fld>
             <a:endParaRPr lang="es-ES"/>
           </a:p>
@@ -9785,7 +9785,7 @@
             <a:fld id="{05D96BC6-CE97-46CE-B948-1334CFE89D44}" type="datetimeFigureOut">
               <a:rPr lang="es-ES" smtClean="0"/>
               <a:pPr/>
-              <a:t>03/03/2014</a:t>
+              <a:t>06/05/2014</a:t>
             </a:fld>
             <a:endParaRPr lang="es-ES"/>
           </a:p>
@@ -9877,7 +9877,7 @@
             <a:fld id="{05D96BC6-CE97-46CE-B948-1334CFE89D44}" type="datetimeFigureOut">
               <a:rPr lang="es-ES" smtClean="0"/>
               <a:pPr/>
-              <a:t>03/03/2014</a:t>
+              <a:t>06/05/2014</a:t>
             </a:fld>
             <a:endParaRPr lang="es-ES"/>
           </a:p>
@@ -10151,7 +10151,7 @@
             <a:fld id="{05D96BC6-CE97-46CE-B948-1334CFE89D44}" type="datetimeFigureOut">
               <a:rPr lang="es-ES" smtClean="0"/>
               <a:pPr/>
-              <a:t>03/03/2014</a:t>
+              <a:t>06/05/2014</a:t>
             </a:fld>
             <a:endParaRPr lang="es-ES"/>
           </a:p>
@@ -10401,7 +10401,7 @@
             <a:fld id="{05D96BC6-CE97-46CE-B948-1334CFE89D44}" type="datetimeFigureOut">
               <a:rPr lang="es-ES" smtClean="0"/>
               <a:pPr/>
-              <a:t>03/03/2014</a:t>
+              <a:t>06/05/2014</a:t>
             </a:fld>
             <a:endParaRPr lang="es-ES"/>
           </a:p>
@@ -10611,7 +10611,7 @@
             <a:fld id="{05D96BC6-CE97-46CE-B948-1334CFE89D44}" type="datetimeFigureOut">
               <a:rPr lang="es-ES" smtClean="0"/>
               <a:pPr/>
-              <a:t>03/03/2014</a:t>
+              <a:t>06/05/2014</a:t>
             </a:fld>
             <a:endParaRPr lang="es-ES"/>
           </a:p>
@@ -11107,13 +11107,7 @@
               <a:rPr lang="es-CO" sz="4400" b="1" dirty="0" smtClean="0">
                 <a:latin typeface="+mj-lt"/>
               </a:rPr>
-              <a:t>Curso </a:t>
-            </a:r>
-            <a:r>
-              <a:rPr lang="es-CO" sz="4400" b="1" dirty="0" smtClean="0">
-                <a:latin typeface="+mj-lt"/>
-              </a:rPr>
-              <a:t>de capacitación virtual en:</a:t>
+              <a:t>Curso de capacitación virtual en:</a:t>
             </a:r>
           </a:p>
           <a:p>
@@ -11133,19 +11127,7 @@
               <a:rPr lang="es-CO" sz="2800" b="1" dirty="0" smtClean="0">
                 <a:latin typeface="+mj-lt"/>
               </a:rPr>
-              <a:t>Prevención del consumo de </a:t>
-            </a:r>
-            <a:r>
-              <a:rPr lang="es-CO" sz="2800" b="1" dirty="0" smtClean="0">
-                <a:latin typeface="+mj-lt"/>
-              </a:rPr>
-              <a:t>alcohol, tabaco </a:t>
-            </a:r>
-            <a:r>
-              <a:rPr lang="es-CO" sz="2800" b="1" dirty="0" smtClean="0">
-                <a:latin typeface="+mj-lt"/>
-              </a:rPr>
-              <a:t>y sustancias psicoactivas.</a:t>
+              <a:t>Prevención del consumo de alcohol, tabaco y sustancias psicoactivas.</a:t>
             </a:r>
           </a:p>
         </p:txBody>
@@ -11191,7 +11173,7 @@
           <p:nvPr>
             <p:extLst>
               <p:ext uri="{D42A27DB-BD31-4B8C-83A1-F6EECF244321}">
-                <p14:modId xmlns="" xmlns:p14="http://schemas.microsoft.com/office/powerpoint/2010/main" val="154027133"/>
+                <p14:modId xmlns:p14="http://schemas.microsoft.com/office/powerpoint/2010/main" val="154027133"/>
               </p:ext>
             </p:extLst>
           </p:nvPr>
@@ -11750,31 +11732,7 @@
             </a:r>
             <a:r>
               <a:rPr lang="es-ES" dirty="0" smtClean="0"/>
-              <a:t>roporcionar herramientas para identificar los factores de riesgos </a:t>
-            </a:r>
-            <a:r>
-              <a:rPr lang="es-ES" dirty="0" smtClean="0"/>
-              <a:t>del </a:t>
-            </a:r>
-            <a:r>
-              <a:rPr lang="es-ES" dirty="0" smtClean="0"/>
-              <a:t>consumo de </a:t>
-            </a:r>
-            <a:r>
-              <a:rPr lang="es-ES" dirty="0" smtClean="0"/>
-              <a:t>alcohol, tabaco </a:t>
-            </a:r>
-            <a:r>
-              <a:rPr lang="es-ES" dirty="0" smtClean="0"/>
-              <a:t>y sustancias </a:t>
-            </a:r>
-            <a:r>
-              <a:rPr lang="es-ES" dirty="0" smtClean="0"/>
-              <a:t>psicoactivas; </a:t>
-            </a:r>
-            <a:r>
-              <a:rPr lang="es-ES" dirty="0" smtClean="0"/>
-              <a:t>y los elementos básicos para establecer acciones preventivas en la empresa.</a:t>
+              <a:t>roporcionar herramientas para identificar los factores de riesgos del consumo de alcohol, tabaco y sustancias psicoactivas; y los elementos básicos para establecer acciones preventivas en la empresa.</a:t>
             </a:r>
           </a:p>
           <a:p>
@@ -11785,7 +11743,7 @@
     </p:spTree>
     <p:extLst>
       <p:ext uri="{BB962C8B-B14F-4D97-AF65-F5344CB8AC3E}">
-        <p14:creationId xmlns:p14="http://schemas.microsoft.com/office/powerpoint/2010/main" xmlns="" val="3546856097"/>
+        <p14:creationId xmlns:p14="http://schemas.microsoft.com/office/powerpoint/2010/main" val="3546856097"/>
       </p:ext>
     </p:extLst>
   </p:cSld>
@@ -11828,7 +11786,7 @@
           <p:nvPr>
             <p:extLst>
               <p:ext uri="{D42A27DB-BD31-4B8C-83A1-F6EECF244321}">
-                <p14:modId xmlns:p14="http://schemas.microsoft.com/office/powerpoint/2010/main" xmlns="" val="1709666259"/>
+                <p14:modId xmlns:p14="http://schemas.microsoft.com/office/powerpoint/2010/main" val="1709666259"/>
               </p:ext>
             </p:extLst>
           </p:nvPr>
@@ -12002,13 +11960,8 @@
                       </a:pPr>
                       <a:r>
                         <a:rPr lang="es-ES" sz="1400" baseline="0" dirty="0" smtClean="0"/>
-                        <a:t> Comprensión del fenómeno del consumo y su impacto en el desempeño laboral de los </a:t>
+                        <a:t> Comprensión del fenómeno del consumo y su impacto en el desempeño laboral de los trabajadores.</a:t>
                       </a:r>
-                      <a:r>
-                        <a:rPr lang="es-ES" sz="1400" baseline="0" dirty="0" smtClean="0"/>
-                        <a:t>trabajadores.</a:t>
-                      </a:r>
-                      <a:endParaRPr lang="es-ES" sz="1400" baseline="0" dirty="0" smtClean="0"/>
                     </a:p>
                     <a:p>
                       <a:pPr marL="0" marR="0" indent="0" algn="l" defTabSz="999256" rtl="0" eaLnBrk="1" fontAlgn="auto" latinLnBrk="0" hangingPunct="1">
@@ -12198,18 +12151,7 @@
                           <a:ea typeface="+mn-ea"/>
                           <a:cs typeface="+mn-cs"/>
                         </a:rPr>
-                        <a:t> Identificación de los elementos para </a:t>
-                      </a:r>
-                      <a:r>
-                        <a:rPr lang="es-ES" sz="1400" b="0" i="0" kern="1200" baseline="0" dirty="0" smtClean="0">
-                          <a:solidFill>
-                            <a:schemeClr val="tx1"/>
-                          </a:solidFill>
-                          <a:latin typeface="+mn-lt"/>
-                          <a:ea typeface="+mn-ea"/>
-                          <a:cs typeface="+mn-cs"/>
-                        </a:rPr>
-                        <a:t> una </a:t>
+                        <a:t> Identificación de los elementos para  una </a:t>
                       </a:r>
                       <a:r>
                         <a:rPr lang="es-CO" sz="1400" b="0" i="0" kern="1200" baseline="0" dirty="0" smtClean="0">
@@ -12270,23 +12212,7 @@
                             <a:schemeClr val="tx1"/>
                           </a:solidFill>
                         </a:rPr>
-                        <a:t> de los conceptos con las </a:t>
-                      </a:r>
-                      <a:r>
-                        <a:rPr lang="es-ES" sz="1400" baseline="0" dirty="0" smtClean="0">
-                          <a:solidFill>
-                            <a:schemeClr val="tx1"/>
-                          </a:solidFill>
-                        </a:rPr>
-                        <a:t>actividades </a:t>
-                      </a:r>
-                      <a:r>
-                        <a:rPr lang="es-ES" sz="1400" baseline="0" dirty="0" smtClean="0">
-                          <a:solidFill>
-                            <a:schemeClr val="tx1"/>
-                          </a:solidFill>
-                        </a:rPr>
-                        <a:t>en la empresa.</a:t>
+                        <a:t> de los conceptos con las actividades en la empresa.</a:t>
                       </a:r>
                       <a:endParaRPr lang="es-ES" sz="1400" dirty="0" smtClean="0">
                         <a:solidFill>
@@ -12398,7 +12324,7 @@
     </p:spTree>
     <p:extLst>
       <p:ext uri="{BB962C8B-B14F-4D97-AF65-F5344CB8AC3E}">
-        <p14:creationId xmlns:p14="http://schemas.microsoft.com/office/powerpoint/2010/main" xmlns="" val="806056345"/>
+        <p14:creationId xmlns:p14="http://schemas.microsoft.com/office/powerpoint/2010/main" val="806056345"/>
       </p:ext>
     </p:extLst>
   </p:cSld>
@@ -12632,7 +12558,7 @@
     </p:spTree>
     <p:extLst>
       <p:ext uri="{BB962C8B-B14F-4D97-AF65-F5344CB8AC3E}">
-        <p14:creationId xmlns:p14="http://schemas.microsoft.com/office/powerpoint/2010/main" xmlns="" val="1710353273"/>
+        <p14:creationId xmlns:p14="http://schemas.microsoft.com/office/powerpoint/2010/main" val="1710353273"/>
       </p:ext>
     </p:extLst>
   </p:cSld>
@@ -12850,15 +12776,7 @@
             </a:pPr>
             <a:r>
               <a:rPr lang="es-CO" sz="1800" dirty="0" smtClean="0"/>
-              <a:t>Recomendaciones para abordar un caso de consumo problemático, permanente y abusivo de </a:t>
-            </a:r>
-            <a:r>
-              <a:rPr lang="es-CO" sz="1800" dirty="0" smtClean="0"/>
-              <a:t>drogas y  acciones </a:t>
-            </a:r>
-            <a:r>
-              <a:rPr lang="es-CO" sz="1800" dirty="0" smtClean="0"/>
-              <a:t>a emprender en relación con la rehabilitación del trabajador que decide tomar un tratamiento por consumo de drogas.</a:t>
+              <a:t>Recomendaciones para abordar un caso de consumo problemático, permanente y abusivo de drogas y  acciones a emprender en relación con la rehabilitación del trabajador que decide tomar un tratamiento por consumo de drogas.</a:t>
             </a:r>
           </a:p>
           <a:p>
@@ -12887,7 +12805,7 @@
     </p:spTree>
     <p:extLst>
       <p:ext uri="{BB962C8B-B14F-4D97-AF65-F5344CB8AC3E}">
-        <p14:creationId xmlns:p14="http://schemas.microsoft.com/office/powerpoint/2010/main" xmlns="" val="29184585"/>
+        <p14:creationId xmlns:p14="http://schemas.microsoft.com/office/powerpoint/2010/main" val="29184585"/>
       </p:ext>
     </p:extLst>
   </p:cSld>
@@ -12931,7 +12849,7 @@
             <p:ph idx="1"/>
             <p:extLst>
               <p:ext uri="{D42A27DB-BD31-4B8C-83A1-F6EECF244321}">
-                <p14:modId xmlns:p14="http://schemas.microsoft.com/office/powerpoint/2010/main" xmlns="" val="1447100334"/>
+                <p14:modId xmlns:p14="http://schemas.microsoft.com/office/powerpoint/2010/main" val="1447100334"/>
               </p:ext>
             </p:extLst>
           </p:nvPr>

</xml_diff>